<commit_message>
Add cell type feature comparisons
</commit_message>
<xml_diff>
--- a/linsley_postdoc/presentations/weekly_meetings/1_25_24.pptx
+++ b/linsley_postdoc/presentations/weekly_meetings/1_25_24.pptx
@@ -5,7 +5,7 @@
     <p:sldMasterId id="2147483648" r:id="rId1"/>
   </p:sldMasterIdLst>
   <p:notesMasterIdLst>
-    <p:notesMasterId r:id="rId16"/>
+    <p:notesMasterId r:id="rId15"/>
   </p:notesMasterIdLst>
   <p:sldIdLst>
     <p:sldId id="477" r:id="rId2"/>
@@ -19,9 +19,8 @@
     <p:sldId id="529" r:id="rId10"/>
     <p:sldId id="538" r:id="rId11"/>
     <p:sldId id="539" r:id="rId12"/>
-    <p:sldId id="540" r:id="rId13"/>
-    <p:sldId id="537" r:id="rId14"/>
-    <p:sldId id="519" r:id="rId15"/>
+    <p:sldId id="537" r:id="rId13"/>
+    <p:sldId id="519" r:id="rId14"/>
   </p:sldIdLst>
   <p:sldSz cx="12192000" cy="6858000"/>
   <p:notesSz cx="6858000" cy="9144000"/>
@@ -756,6 +755,18 @@
                 <a:effectLst/>
                 <a:latin typeface="Menlo" panose="020B0609030804020204" pitchFamily="49" charset="0"/>
               </a:rPr>
+              <a:t>myocarditis</a:t>
+            </a:r>
+          </a:p>
+          <a:p>
+            <a:r>
+              <a:rPr lang="en-US" b="0" dirty="0">
+                <a:solidFill>
+                  <a:srgbClr val="CCCCCC"/>
+                </a:solidFill>
+                <a:effectLst/>
+                <a:latin typeface="Menlo" panose="020B0609030804020204" pitchFamily="49" charset="0"/>
+              </a:rPr>
               <a:t># </a:t>
             </a:r>
             <a:r>
@@ -890,6 +901,100 @@
                 <a:latin typeface="Menlo" panose="020B0609030804020204" pitchFamily="49" charset="0"/>
               </a:rPr>
               <a:t># MAITs: 8.52e-12</a:t>
+            </a:r>
+          </a:p>
+          <a:p>
+            <a:endParaRPr lang="en-US" b="0" dirty="0">
+              <a:solidFill>
+                <a:srgbClr val="CCCCCC"/>
+              </a:solidFill>
+              <a:effectLst/>
+              <a:latin typeface="Menlo" panose="020B0609030804020204" pitchFamily="49" charset="0"/>
+            </a:endParaRPr>
+          </a:p>
+          <a:p>
+            <a:r>
+              <a:rPr lang="en-US" b="0" dirty="0">
+                <a:solidFill>
+                  <a:srgbClr val="CCCCCC"/>
+                </a:solidFill>
+                <a:effectLst/>
+                <a:latin typeface="Menlo" panose="020B0609030804020204" pitchFamily="49" charset="0"/>
+              </a:rPr>
+              <a:t>Colitis:</a:t>
+            </a:r>
+          </a:p>
+          <a:p>
+            <a:r>
+              <a:rPr lang="en-US" b="0" dirty="0">
+                <a:solidFill>
+                  <a:srgbClr val="CCCCCC"/>
+                </a:solidFill>
+                <a:effectLst/>
+                <a:latin typeface="Menlo" panose="020B0609030804020204" pitchFamily="49" charset="0"/>
+              </a:rPr>
+              <a:t># cdr3 </a:t>
+            </a:r>
+            <a:r>
+              <a:rPr lang="en-US" b="0" dirty="0" err="1">
+                <a:solidFill>
+                  <a:srgbClr val="CCCCCC"/>
+                </a:solidFill>
+                <a:effectLst/>
+                <a:latin typeface="Menlo" panose="020B0609030804020204" pitchFamily="49" charset="0"/>
+              </a:rPr>
+              <a:t>pgen</a:t>
+            </a:r>
+            <a:r>
+              <a:rPr lang="en-US" b="0" dirty="0">
+                <a:solidFill>
+                  <a:srgbClr val="CCCCCC"/>
+                </a:solidFill>
+                <a:effectLst/>
+                <a:latin typeface="Menlo" panose="020B0609030804020204" pitchFamily="49" charset="0"/>
+              </a:rPr>
+              <a:t> TRA </a:t>
+            </a:r>
+            <a:r>
+              <a:rPr lang="en-US" b="0" dirty="0" err="1">
+                <a:solidFill>
+                  <a:srgbClr val="CCCCCC"/>
+                </a:solidFill>
+                <a:effectLst/>
+                <a:latin typeface="Menlo" panose="020B0609030804020204" pitchFamily="49" charset="0"/>
+              </a:rPr>
+              <a:t>padj</a:t>
+            </a:r>
+            <a:endParaRPr lang="en-US" b="0" dirty="0">
+              <a:solidFill>
+                <a:srgbClr val="CCCCCC"/>
+              </a:solidFill>
+              <a:effectLst/>
+              <a:latin typeface="Menlo" panose="020B0609030804020204" pitchFamily="49" charset="0"/>
+            </a:endParaRPr>
+          </a:p>
+          <a:p>
+            <a:r>
+              <a:rPr lang="en-US" b="0" dirty="0">
+                <a:solidFill>
+                  <a:srgbClr val="CCCCCC"/>
+                </a:solidFill>
+                <a:effectLst/>
+                <a:latin typeface="Menlo" panose="020B0609030804020204" pitchFamily="49" charset="0"/>
+              </a:rPr>
+              <a:t># MAIT: 6.635000e-13</a:t>
+            </a:r>
+          </a:p>
+          <a:p>
+            <a:r>
+              <a:rPr lang="en-US" b="0" dirty="0">
+                <a:solidFill>
+                  <a:srgbClr val="CCCCCC"/>
+                </a:solidFill>
+                <a:effectLst/>
+                <a:latin typeface="Menlo" panose="020B0609030804020204" pitchFamily="49" charset="0"/>
+              </a:rPr>
+              <a:t># cdr3 length # MAIT: 2.3965e-10</a:t>
             </a:r>
           </a:p>
         </p:txBody>
@@ -937,256 +1042,6 @@
 </file>
 
 <file path=ppt/notesSlides/notesSlide12.xml><?xml version="1.0" encoding="utf-8"?>
-<p:notes xmlns:a="http://schemas.openxmlformats.org/drawingml/2006/main" xmlns:r="http://schemas.openxmlformats.org/officeDocument/2006/relationships" xmlns:p="http://schemas.openxmlformats.org/presentationml/2006/main">
-  <p:cSld>
-    <p:spTree>
-      <p:nvGrpSpPr>
-        <p:cNvPr id="1" name="">
-          <a:extLst>
-            <a:ext uri="{FF2B5EF4-FFF2-40B4-BE49-F238E27FC236}">
-              <a16:creationId xmlns:a16="http://schemas.microsoft.com/office/drawing/2014/main" id="{0BEEB9A3-50F8-6FDE-9D9D-D7D22C462B9A}"/>
-            </a:ext>
-          </a:extLst>
-        </p:cNvPr>
-        <p:cNvGrpSpPr/>
-        <p:nvPr/>
-      </p:nvGrpSpPr>
-      <p:grpSpPr>
-        <a:xfrm>
-          <a:off x="0" y="0"/>
-          <a:ext cx="0" cy="0"/>
-          <a:chOff x="0" y="0"/>
-          <a:chExt cx="0" cy="0"/>
-        </a:xfrm>
-      </p:grpSpPr>
-      <p:sp>
-        <p:nvSpPr>
-          <p:cNvPr id="2" name="Slide Image Placeholder 1">
-            <a:extLst>
-              <a:ext uri="{FF2B5EF4-FFF2-40B4-BE49-F238E27FC236}">
-                <a16:creationId xmlns:a16="http://schemas.microsoft.com/office/drawing/2014/main" id="{27839FF5-7F75-0610-3E13-C79D54704374}"/>
-              </a:ext>
-            </a:extLst>
-          </p:cNvPr>
-          <p:cNvSpPr>
-            <a:spLocks noGrp="1" noRot="1" noChangeAspect="1"/>
-          </p:cNvSpPr>
-          <p:nvPr>
-            <p:ph type="sldImg"/>
-          </p:nvPr>
-        </p:nvSpPr>
-        <p:spPr/>
-      </p:sp>
-      <p:sp>
-        <p:nvSpPr>
-          <p:cNvPr id="3" name="Notes Placeholder 2">
-            <a:extLst>
-              <a:ext uri="{FF2B5EF4-FFF2-40B4-BE49-F238E27FC236}">
-                <a16:creationId xmlns:a16="http://schemas.microsoft.com/office/drawing/2014/main" id="{4D9BE822-6C83-1486-1F12-4B93F2F6036B}"/>
-              </a:ext>
-            </a:extLst>
-          </p:cNvPr>
-          <p:cNvSpPr>
-            <a:spLocks noGrp="1"/>
-          </p:cNvSpPr>
-          <p:nvPr>
-            <p:ph type="body" idx="1"/>
-          </p:nvPr>
-        </p:nvSpPr>
-        <p:spPr/>
-        <p:txBody>
-          <a:bodyPr/>
-          <a:lstStyle/>
-          <a:p>
-            <a:r>
-              <a:rPr lang="en-US" b="0" dirty="0">
-                <a:solidFill>
-                  <a:srgbClr val="CCCCCC"/>
-                </a:solidFill>
-                <a:effectLst/>
-                <a:latin typeface="Menlo" panose="020B0609030804020204" pitchFamily="49" charset="0"/>
-              </a:rPr>
-              <a:t># </a:t>
-            </a:r>
-            <a:r>
-              <a:rPr lang="en-US" b="0" dirty="0" err="1">
-                <a:solidFill>
-                  <a:srgbClr val="CCCCCC"/>
-                </a:solidFill>
-                <a:effectLst/>
-                <a:latin typeface="Menlo" panose="020B0609030804020204" pitchFamily="49" charset="0"/>
-              </a:rPr>
-              <a:t>pgen</a:t>
-            </a:r>
-            <a:r>
-              <a:rPr lang="en-US" b="0" dirty="0">
-                <a:solidFill>
-                  <a:srgbClr val="CCCCCC"/>
-                </a:solidFill>
-                <a:effectLst/>
-                <a:latin typeface="Menlo" panose="020B0609030804020204" pitchFamily="49" charset="0"/>
-              </a:rPr>
-              <a:t> (TRA) </a:t>
-            </a:r>
-            <a:r>
-              <a:rPr lang="en-US" b="0" dirty="0" err="1">
-                <a:solidFill>
-                  <a:srgbClr val="CCCCCC"/>
-                </a:solidFill>
-                <a:effectLst/>
-                <a:latin typeface="Menlo" panose="020B0609030804020204" pitchFamily="49" charset="0"/>
-              </a:rPr>
-              <a:t>padj</a:t>
-            </a:r>
-            <a:r>
-              <a:rPr lang="en-US" b="0" dirty="0">
-                <a:solidFill>
-                  <a:srgbClr val="CCCCCC"/>
-                </a:solidFill>
-                <a:effectLst/>
-                <a:latin typeface="Menlo" panose="020B0609030804020204" pitchFamily="49" charset="0"/>
-              </a:rPr>
-              <a:t> </a:t>
-            </a:r>
-            <a:r>
-              <a:rPr lang="en-US" b="0" dirty="0" err="1">
-                <a:solidFill>
-                  <a:srgbClr val="CCCCCC"/>
-                </a:solidFill>
-                <a:effectLst/>
-                <a:latin typeface="Menlo" panose="020B0609030804020204" pitchFamily="49" charset="0"/>
-              </a:rPr>
-              <a:t>vals</a:t>
-            </a:r>
-            <a:endParaRPr lang="en-US" b="0" dirty="0">
-              <a:solidFill>
-                <a:srgbClr val="CCCCCC"/>
-              </a:solidFill>
-              <a:effectLst/>
-              <a:latin typeface="Menlo" panose="020B0609030804020204" pitchFamily="49" charset="0"/>
-            </a:endParaRPr>
-          </a:p>
-          <a:p>
-            <a:r>
-              <a:rPr lang="en-US" b="0" dirty="0">
-                <a:solidFill>
-                  <a:srgbClr val="CCCCCC"/>
-                </a:solidFill>
-                <a:effectLst/>
-                <a:latin typeface="Menlo" panose="020B0609030804020204" pitchFamily="49" charset="0"/>
-              </a:rPr>
-              <a:t># CD4 TEM: 4.85e-3</a:t>
-            </a:r>
-          </a:p>
-          <a:p>
-            <a:r>
-              <a:rPr lang="en-US" b="0" dirty="0">
-                <a:solidFill>
-                  <a:srgbClr val="CCCCCC"/>
-                </a:solidFill>
-                <a:effectLst/>
-                <a:latin typeface="Menlo" panose="020B0609030804020204" pitchFamily="49" charset="0"/>
-              </a:rPr>
-              <a:t># CDR3 length (TRA): </a:t>
-            </a:r>
-            <a:r>
-              <a:rPr lang="en-US" b="0" dirty="0" err="1">
-                <a:solidFill>
-                  <a:srgbClr val="CCCCCC"/>
-                </a:solidFill>
-                <a:effectLst/>
-                <a:latin typeface="Menlo" panose="020B0609030804020204" pitchFamily="49" charset="0"/>
-              </a:rPr>
-              <a:t>padj</a:t>
-            </a:r>
-            <a:r>
-              <a:rPr lang="en-US" b="0" dirty="0">
-                <a:solidFill>
-                  <a:srgbClr val="CCCCCC"/>
-                </a:solidFill>
-                <a:effectLst/>
-                <a:latin typeface="Menlo" panose="020B0609030804020204" pitchFamily="49" charset="0"/>
-              </a:rPr>
-              <a:t> </a:t>
-            </a:r>
-            <a:r>
-              <a:rPr lang="en-US" b="0" dirty="0" err="1">
-                <a:solidFill>
-                  <a:srgbClr val="CCCCCC"/>
-                </a:solidFill>
-                <a:effectLst/>
-                <a:latin typeface="Menlo" panose="020B0609030804020204" pitchFamily="49" charset="0"/>
-              </a:rPr>
-              <a:t>vals</a:t>
-            </a:r>
-            <a:r>
-              <a:rPr lang="en-US" b="0" dirty="0">
-                <a:solidFill>
-                  <a:srgbClr val="CCCCCC"/>
-                </a:solidFill>
-                <a:effectLst/>
-                <a:latin typeface="Menlo" panose="020B0609030804020204" pitchFamily="49" charset="0"/>
-              </a:rPr>
-              <a:t> (adjusted within 5 cell types I tested for this feature for TRA)</a:t>
-            </a:r>
-          </a:p>
-          <a:p>
-            <a:r>
-              <a:rPr lang="en-US" b="0" dirty="0">
-                <a:solidFill>
-                  <a:srgbClr val="CCCCCC"/>
-                </a:solidFill>
-                <a:effectLst/>
-                <a:latin typeface="Menlo" panose="020B0609030804020204" pitchFamily="49" charset="0"/>
-              </a:rPr>
-              <a:t># CD4 TEM: 1.6335e-3</a:t>
-            </a:r>
-          </a:p>
-        </p:txBody>
-      </p:sp>
-      <p:sp>
-        <p:nvSpPr>
-          <p:cNvPr id="4" name="Slide Number Placeholder 3">
-            <a:extLst>
-              <a:ext uri="{FF2B5EF4-FFF2-40B4-BE49-F238E27FC236}">
-                <a16:creationId xmlns:a16="http://schemas.microsoft.com/office/drawing/2014/main" id="{0FA763C7-52A6-B440-602A-BA448EEBAE4D}"/>
-              </a:ext>
-            </a:extLst>
-          </p:cNvPr>
-          <p:cNvSpPr>
-            <a:spLocks noGrp="1"/>
-          </p:cNvSpPr>
-          <p:nvPr>
-            <p:ph type="sldNum" sz="quarter" idx="5"/>
-          </p:nvPr>
-        </p:nvSpPr>
-        <p:spPr/>
-        <p:txBody>
-          <a:bodyPr/>
-          <a:lstStyle/>
-          <a:p>
-            <a:fld id="{061BAA8C-FDC6-D345-B4E0-3B02449209FB}" type="slidenum">
-              <a:rPr lang="en-US" smtClean="0"/>
-              <a:t>12</a:t>
-            </a:fld>
-            <a:endParaRPr lang="en-US"/>
-          </a:p>
-        </p:txBody>
-      </p:sp>
-    </p:spTree>
-    <p:extLst>
-      <p:ext uri="{BB962C8B-B14F-4D97-AF65-F5344CB8AC3E}">
-        <p14:creationId xmlns:p14="http://schemas.microsoft.com/office/powerpoint/2010/main" val="3347068622"/>
-      </p:ext>
-    </p:extLst>
-  </p:cSld>
-  <p:clrMapOvr>
-    <a:masterClrMapping/>
-  </p:clrMapOvr>
-</p:notes>
-</file>
-
-<file path=ppt/notesSlides/notesSlide13.xml><?xml version="1.0" encoding="utf-8"?>
 <p:notes xmlns:a="http://schemas.openxmlformats.org/drawingml/2006/main" xmlns:r="http://schemas.openxmlformats.org/officeDocument/2006/relationships" xmlns:p="http://schemas.openxmlformats.org/presentationml/2006/main">
   <p:cSld>
     <p:spTree>
@@ -1281,7 +1136,7 @@
           <a:p>
             <a:fld id="{061BAA8C-FDC6-D345-B4E0-3B02449209FB}" type="slidenum">
               <a:rPr lang="en-US" smtClean="0"/>
-              <a:t>13</a:t>
+              <a:t>12</a:t>
             </a:fld>
             <a:endParaRPr lang="en-US"/>
           </a:p>
@@ -1300,7 +1155,7 @@
 </p:notes>
 </file>
 
-<file path=ppt/notesSlides/notesSlide14.xml><?xml version="1.0" encoding="utf-8"?>
+<file path=ppt/notesSlides/notesSlide13.xml><?xml version="1.0" encoding="utf-8"?>
 <p:notes xmlns:a="http://schemas.openxmlformats.org/drawingml/2006/main" xmlns:r="http://schemas.openxmlformats.org/officeDocument/2006/relationships" xmlns:p="http://schemas.openxmlformats.org/presentationml/2006/main">
   <p:cSld>
     <p:spTree>
@@ -1371,7 +1226,7 @@
           <a:p>
             <a:fld id="{061BAA8C-FDC6-D345-B4E0-3B02449209FB}" type="slidenum">
               <a:rPr lang="en-US" smtClean="0"/>
-              <a:t>14</a:t>
+              <a:t>13</a:t>
             </a:fld>
             <a:endParaRPr lang="en-US"/>
           </a:p>
@@ -5908,7 +5763,7 @@
           <a:p>
             <a:r>
               <a:rPr lang="en-US" dirty="0"/>
-              <a:t>Myocarditis dataset: MAITs (less abundant in </a:t>
+              <a:t>In both datasets, MAITs (less abundant in </a:t>
             </a:r>
             <a:r>
               <a:rPr lang="en-US" dirty="0" err="1"/>
@@ -5943,8 +5798,8 @@
         </p:blipFill>
         <p:spPr>
           <a:xfrm>
-            <a:off x="5984341" y="2164307"/>
-            <a:ext cx="6164655" cy="3621625"/>
+            <a:off x="7088524" y="2164308"/>
+            <a:ext cx="3892755" cy="2286924"/>
           </a:xfrm>
           <a:prstGeom prst="rect">
             <a:avLst/>
@@ -5973,8 +5828,8 @@
         </p:blipFill>
         <p:spPr>
           <a:xfrm>
-            <a:off x="1" y="2164306"/>
-            <a:ext cx="5939134" cy="3621625"/>
+            <a:off x="1104183" y="2164307"/>
+            <a:ext cx="3750347" cy="2286924"/>
           </a:xfrm>
           <a:prstGeom prst="rect">
             <a:avLst/>
@@ -5983,10 +5838,10 @@
       </p:pic>
       <p:sp>
         <p:nvSpPr>
-          <p:cNvPr id="13" name="TextBox 12">
-            <a:extLst>
-              <a:ext uri="{FF2B5EF4-FFF2-40B4-BE49-F238E27FC236}">
-                <a16:creationId xmlns:a16="http://schemas.microsoft.com/office/drawing/2014/main" id="{83BB2B69-94DC-35DD-B2B2-963C08E5972C}"/>
+          <p:cNvPr id="14" name="TextBox 13">
+            <a:extLst>
+              <a:ext uri="{FF2B5EF4-FFF2-40B4-BE49-F238E27FC236}">
+                <a16:creationId xmlns:a16="http://schemas.microsoft.com/office/drawing/2014/main" id="{6AECA72F-609D-BF32-C4C7-9663472177BB}"/>
               </a:ext>
             </a:extLst>
           </p:cNvPr>
@@ -5995,7 +5850,172 @@
         </p:nvSpPr>
         <p:spPr>
           <a:xfrm>
-            <a:off x="2717345" y="6488668"/>
+            <a:off x="2839075" y="2656934"/>
+            <a:ext cx="646331" cy="369332"/>
+          </a:xfrm>
+          <a:prstGeom prst="rect">
+            <a:avLst/>
+          </a:prstGeom>
+          <a:noFill/>
+        </p:spPr>
+        <p:txBody>
+          <a:bodyPr wrap="none" rtlCol="0">
+            <a:spAutoFit/>
+          </a:bodyPr>
+          <a:lstStyle/>
+          <a:p>
+            <a:r>
+              <a:rPr lang="en-US" dirty="0"/>
+              <a:t>****</a:t>
+            </a:r>
+          </a:p>
+        </p:txBody>
+      </p:sp>
+      <p:sp>
+        <p:nvSpPr>
+          <p:cNvPr id="15" name="TextBox 14">
+            <a:extLst>
+              <a:ext uri="{FF2B5EF4-FFF2-40B4-BE49-F238E27FC236}">
+                <a16:creationId xmlns:a16="http://schemas.microsoft.com/office/drawing/2014/main" id="{E965995E-5D50-F00C-C1AD-3814ECCD5725}"/>
+              </a:ext>
+            </a:extLst>
+          </p:cNvPr>
+          <p:cNvSpPr txBox="1"/>
+          <p:nvPr/>
+        </p:nvSpPr>
+        <p:spPr>
+          <a:xfrm>
+            <a:off x="8926450" y="2656934"/>
+            <a:ext cx="646331" cy="369332"/>
+          </a:xfrm>
+          <a:prstGeom prst="rect">
+            <a:avLst/>
+          </a:prstGeom>
+          <a:noFill/>
+        </p:spPr>
+        <p:txBody>
+          <a:bodyPr wrap="none" rtlCol="0">
+            <a:spAutoFit/>
+          </a:bodyPr>
+          <a:lstStyle/>
+          <a:p>
+            <a:r>
+              <a:rPr lang="en-US" dirty="0"/>
+              <a:t>****</a:t>
+            </a:r>
+          </a:p>
+        </p:txBody>
+      </p:sp>
+      <p:sp>
+        <p:nvSpPr>
+          <p:cNvPr id="3" name="TextBox 2">
+            <a:extLst>
+              <a:ext uri="{FF2B5EF4-FFF2-40B4-BE49-F238E27FC236}">
+                <a16:creationId xmlns:a16="http://schemas.microsoft.com/office/drawing/2014/main" id="{66465532-5A83-BB78-7717-CD185C2E08B4}"/>
+              </a:ext>
+            </a:extLst>
+          </p:cNvPr>
+          <p:cNvSpPr txBox="1"/>
+          <p:nvPr/>
+        </p:nvSpPr>
+        <p:spPr>
+          <a:xfrm>
+            <a:off x="4854530" y="3014920"/>
+            <a:ext cx="2031838" cy="369332"/>
+          </a:xfrm>
+          <a:prstGeom prst="rect">
+            <a:avLst/>
+          </a:prstGeom>
+          <a:noFill/>
+        </p:spPr>
+        <p:txBody>
+          <a:bodyPr wrap="none" rtlCol="0">
+            <a:spAutoFit/>
+          </a:bodyPr>
+          <a:lstStyle/>
+          <a:p>
+            <a:r>
+              <a:rPr lang="en-US" dirty="0"/>
+              <a:t>Myocarditis dataset</a:t>
+            </a:r>
+          </a:p>
+        </p:txBody>
+      </p:sp>
+      <p:pic>
+        <p:nvPicPr>
+          <p:cNvPr id="6" name="Picture 5">
+            <a:extLst>
+              <a:ext uri="{FF2B5EF4-FFF2-40B4-BE49-F238E27FC236}">
+                <a16:creationId xmlns:a16="http://schemas.microsoft.com/office/drawing/2014/main" id="{2D7E530B-9E5E-2B3F-AE88-EDD9299DD2A1}"/>
+              </a:ext>
+            </a:extLst>
+          </p:cNvPr>
+          <p:cNvPicPr>
+            <a:picLocks noChangeAspect="1"/>
+          </p:cNvPicPr>
+          <p:nvPr/>
+        </p:nvPicPr>
+        <p:blipFill>
+          <a:blip r:embed="rId5"/>
+          <a:stretch>
+            <a:fillRect/>
+          </a:stretch>
+        </p:blipFill>
+        <p:spPr>
+          <a:xfrm>
+            <a:off x="1104183" y="4451231"/>
+            <a:ext cx="3750347" cy="2269250"/>
+          </a:xfrm>
+          <a:prstGeom prst="rect">
+            <a:avLst/>
+          </a:prstGeom>
+        </p:spPr>
+      </p:pic>
+      <p:pic>
+        <p:nvPicPr>
+          <p:cNvPr id="9" name="Picture 8">
+            <a:extLst>
+              <a:ext uri="{FF2B5EF4-FFF2-40B4-BE49-F238E27FC236}">
+                <a16:creationId xmlns:a16="http://schemas.microsoft.com/office/drawing/2014/main" id="{ECCF2A1F-A589-F6EF-BFED-6A5C2B3F7EE6}"/>
+              </a:ext>
+            </a:extLst>
+          </p:cNvPr>
+          <p:cNvPicPr>
+            <a:picLocks noChangeAspect="1"/>
+          </p:cNvPicPr>
+          <p:nvPr/>
+        </p:nvPicPr>
+        <p:blipFill>
+          <a:blip r:embed="rId6"/>
+          <a:stretch>
+            <a:fillRect/>
+          </a:stretch>
+        </p:blipFill>
+        <p:spPr>
+          <a:xfrm>
+            <a:off x="7088524" y="4451231"/>
+            <a:ext cx="3579963" cy="2210855"/>
+          </a:xfrm>
+          <a:prstGeom prst="rect">
+            <a:avLst/>
+          </a:prstGeom>
+        </p:spPr>
+      </p:pic>
+      <p:sp>
+        <p:nvSpPr>
+          <p:cNvPr id="13" name="TextBox 12">
+            <a:extLst>
+              <a:ext uri="{FF2B5EF4-FFF2-40B4-BE49-F238E27FC236}">
+                <a16:creationId xmlns:a16="http://schemas.microsoft.com/office/drawing/2014/main" id="{83BB2B69-94DC-35DD-B2B2-963C08E5972C}"/>
+              </a:ext>
+            </a:extLst>
+          </p:cNvPr>
+          <p:cNvSpPr txBox="1"/>
+          <p:nvPr/>
+        </p:nvSpPr>
+        <p:spPr>
+          <a:xfrm>
+            <a:off x="3598626" y="6479509"/>
             <a:ext cx="7382653" cy="369332"/>
           </a:xfrm>
           <a:prstGeom prst="rect">
@@ -6076,10 +6096,10 @@
       </p:sp>
       <p:sp>
         <p:nvSpPr>
-          <p:cNvPr id="14" name="TextBox 13">
-            <a:extLst>
-              <a:ext uri="{FF2B5EF4-FFF2-40B4-BE49-F238E27FC236}">
-                <a16:creationId xmlns:a16="http://schemas.microsoft.com/office/drawing/2014/main" id="{6AECA72F-609D-BF32-C4C7-9663472177BB}"/>
+          <p:cNvPr id="10" name="TextBox 9">
+            <a:extLst>
+              <a:ext uri="{FF2B5EF4-FFF2-40B4-BE49-F238E27FC236}">
+                <a16:creationId xmlns:a16="http://schemas.microsoft.com/office/drawing/2014/main" id="{8E134D2A-7BE4-B076-5C79-E3F1DB16642A}"/>
               </a:ext>
             </a:extLst>
           </p:cNvPr>
@@ -6088,7 +6108,7 @@
         </p:nvSpPr>
         <p:spPr>
           <a:xfrm>
-            <a:off x="2882205" y="2329132"/>
+            <a:off x="2758562" y="4922690"/>
             <a:ext cx="646331" cy="369332"/>
           </a:xfrm>
           <a:prstGeom prst="rect">
@@ -6111,10 +6131,10 @@
       </p:sp>
       <p:sp>
         <p:nvSpPr>
-          <p:cNvPr id="15" name="TextBox 14">
-            <a:extLst>
-              <a:ext uri="{FF2B5EF4-FFF2-40B4-BE49-F238E27FC236}">
-                <a16:creationId xmlns:a16="http://schemas.microsoft.com/office/drawing/2014/main" id="{E965995E-5D50-F00C-C1AD-3814ECCD5725}"/>
+          <p:cNvPr id="12" name="TextBox 11">
+            <a:extLst>
+              <a:ext uri="{FF2B5EF4-FFF2-40B4-BE49-F238E27FC236}">
+                <a16:creationId xmlns:a16="http://schemas.microsoft.com/office/drawing/2014/main" id="{E186D4C3-19AA-6D63-54E3-6B01C2CA25B9}"/>
               </a:ext>
             </a:extLst>
           </p:cNvPr>
@@ -6123,7 +6143,7 @@
         </p:nvSpPr>
         <p:spPr>
           <a:xfrm>
-            <a:off x="9081722" y="2329132"/>
+            <a:off x="8845937" y="4922690"/>
             <a:ext cx="646331" cy="369332"/>
           </a:xfrm>
           <a:prstGeom prst="rect">
@@ -6140,6 +6160,41 @@
             <a:r>
               <a:rPr lang="en-US" dirty="0"/>
               <a:t>****</a:t>
+            </a:r>
+          </a:p>
+        </p:txBody>
+      </p:sp>
+      <p:sp>
+        <p:nvSpPr>
+          <p:cNvPr id="16" name="TextBox 15">
+            <a:extLst>
+              <a:ext uri="{FF2B5EF4-FFF2-40B4-BE49-F238E27FC236}">
+                <a16:creationId xmlns:a16="http://schemas.microsoft.com/office/drawing/2014/main" id="{D9A540A9-F87A-1363-F9DC-7D957B7A12F3}"/>
+              </a:ext>
+            </a:extLst>
+          </p:cNvPr>
+          <p:cNvSpPr txBox="1"/>
+          <p:nvPr/>
+        </p:nvSpPr>
+        <p:spPr>
+          <a:xfrm>
+            <a:off x="5160208" y="5218548"/>
+            <a:ext cx="1504194" cy="369332"/>
+          </a:xfrm>
+          <a:prstGeom prst="rect">
+            <a:avLst/>
+          </a:prstGeom>
+          <a:noFill/>
+        </p:spPr>
+        <p:txBody>
+          <a:bodyPr wrap="none" rtlCol="0">
+            <a:spAutoFit/>
+          </a:bodyPr>
+          <a:lstStyle/>
+          <a:p>
+            <a:r>
+              <a:rPr lang="en-US" dirty="0"/>
+              <a:t>Colitis dataset</a:t>
             </a:r>
           </a:p>
         </p:txBody>
@@ -6158,312 +6213,6 @@
 </file>
 
 <file path=ppt/slides/slide12.xml><?xml version="1.0" encoding="utf-8"?>
-<p:sld xmlns:a="http://schemas.openxmlformats.org/drawingml/2006/main" xmlns:r="http://schemas.openxmlformats.org/officeDocument/2006/relationships" xmlns:p="http://schemas.openxmlformats.org/presentationml/2006/main">
-  <p:cSld>
-    <p:spTree>
-      <p:nvGrpSpPr>
-        <p:cNvPr id="1" name="">
-          <a:extLst>
-            <a:ext uri="{FF2B5EF4-FFF2-40B4-BE49-F238E27FC236}">
-              <a16:creationId xmlns:a16="http://schemas.microsoft.com/office/drawing/2014/main" id="{F7E19950-3191-BE08-C2CE-72E62F792442}"/>
-            </a:ext>
-          </a:extLst>
-        </p:cNvPr>
-        <p:cNvGrpSpPr/>
-        <p:nvPr/>
-      </p:nvGrpSpPr>
-      <p:grpSpPr>
-        <a:xfrm>
-          <a:off x="0" y="0"/>
-          <a:ext cx="0" cy="0"/>
-          <a:chOff x="0" y="0"/>
-          <a:chExt cx="0" cy="0"/>
-        </a:xfrm>
-      </p:grpSpPr>
-      <p:sp>
-        <p:nvSpPr>
-          <p:cNvPr id="2" name="Title 1">
-            <a:extLst>
-              <a:ext uri="{FF2B5EF4-FFF2-40B4-BE49-F238E27FC236}">
-                <a16:creationId xmlns:a16="http://schemas.microsoft.com/office/drawing/2014/main" id="{E36ECF4A-66F3-B00E-EE23-C52E9CBBC1F9}"/>
-              </a:ext>
-            </a:extLst>
-          </p:cNvPr>
-          <p:cNvSpPr>
-            <a:spLocks noGrp="1"/>
-          </p:cNvSpPr>
-          <p:nvPr>
-            <p:ph type="title"/>
-          </p:nvPr>
-        </p:nvSpPr>
-        <p:spPr>
-          <a:xfrm>
-            <a:off x="838200" y="593725"/>
-            <a:ext cx="10515600" cy="1325563"/>
-          </a:xfrm>
-        </p:spPr>
-        <p:txBody>
-          <a:bodyPr>
-            <a:normAutofit fontScale="90000"/>
-          </a:bodyPr>
-          <a:lstStyle/>
-          <a:p>
-            <a:r>
-              <a:rPr lang="en-US"/>
-              <a:t>Myocarditis </a:t>
-            </a:r>
-            <a:r>
-              <a:rPr lang="en-US" dirty="0"/>
-              <a:t>dataset: CD4 TEMs (less abundant in </a:t>
-            </a:r>
-            <a:r>
-              <a:rPr lang="en-US" dirty="0" err="1"/>
-              <a:t>irAE</a:t>
-            </a:r>
-            <a:r>
-              <a:rPr lang="en-US" dirty="0"/>
-              <a:t> colitis tissue) have shorter TRA CDR3s and more germline-like TRA chains vs. other cell types</a:t>
-            </a:r>
-          </a:p>
-        </p:txBody>
-      </p:sp>
-      <p:pic>
-        <p:nvPicPr>
-          <p:cNvPr id="3" name="Picture 2">
-            <a:extLst>
-              <a:ext uri="{FF2B5EF4-FFF2-40B4-BE49-F238E27FC236}">
-                <a16:creationId xmlns:a16="http://schemas.microsoft.com/office/drawing/2014/main" id="{12E8DA99-3AB6-6725-9683-685B05D0A97E}"/>
-              </a:ext>
-            </a:extLst>
-          </p:cNvPr>
-          <p:cNvPicPr>
-            <a:picLocks noChangeAspect="1"/>
-          </p:cNvPicPr>
-          <p:nvPr/>
-        </p:nvPicPr>
-        <p:blipFill>
-          <a:blip r:embed="rId3"/>
-          <a:stretch>
-            <a:fillRect/>
-          </a:stretch>
-        </p:blipFill>
-        <p:spPr>
-          <a:xfrm>
-            <a:off x="6186535" y="2111418"/>
-            <a:ext cx="5859377" cy="3518993"/>
-          </a:xfrm>
-          <a:prstGeom prst="rect">
-            <a:avLst/>
-          </a:prstGeom>
-        </p:spPr>
-      </p:pic>
-      <p:pic>
-        <p:nvPicPr>
-          <p:cNvPr id="4" name="Picture 3">
-            <a:extLst>
-              <a:ext uri="{FF2B5EF4-FFF2-40B4-BE49-F238E27FC236}">
-                <a16:creationId xmlns:a16="http://schemas.microsoft.com/office/drawing/2014/main" id="{33EC8ED5-344C-AB19-03AF-3D0DC2F5BBD1}"/>
-              </a:ext>
-            </a:extLst>
-          </p:cNvPr>
-          <p:cNvPicPr>
-            <a:picLocks noChangeAspect="1"/>
-          </p:cNvPicPr>
-          <p:nvPr/>
-        </p:nvPicPr>
-        <p:blipFill>
-          <a:blip r:embed="rId4"/>
-          <a:stretch>
-            <a:fillRect/>
-          </a:stretch>
-        </p:blipFill>
-        <p:spPr>
-          <a:xfrm>
-            <a:off x="90535" y="2119765"/>
-            <a:ext cx="5859377" cy="3510646"/>
-          </a:xfrm>
-          <a:prstGeom prst="rect">
-            <a:avLst/>
-          </a:prstGeom>
-        </p:spPr>
-      </p:pic>
-      <p:sp>
-        <p:nvSpPr>
-          <p:cNvPr id="7" name="TextBox 6">
-            <a:extLst>
-              <a:ext uri="{FF2B5EF4-FFF2-40B4-BE49-F238E27FC236}">
-                <a16:creationId xmlns:a16="http://schemas.microsoft.com/office/drawing/2014/main" id="{D6FF6E64-79B4-2EC1-C03F-53D2EFDD1AFD}"/>
-              </a:ext>
-            </a:extLst>
-          </p:cNvPr>
-          <p:cNvSpPr txBox="1"/>
-          <p:nvPr/>
-        </p:nvSpPr>
-        <p:spPr>
-          <a:xfrm>
-            <a:off x="3037475" y="2329132"/>
-            <a:ext cx="415498" cy="369332"/>
-          </a:xfrm>
-          <a:prstGeom prst="rect">
-            <a:avLst/>
-          </a:prstGeom>
-          <a:noFill/>
-        </p:spPr>
-        <p:txBody>
-          <a:bodyPr wrap="none" rtlCol="0">
-            <a:spAutoFit/>
-          </a:bodyPr>
-          <a:lstStyle/>
-          <a:p>
-            <a:r>
-              <a:rPr lang="en-US" dirty="0"/>
-              <a:t>**</a:t>
-            </a:r>
-          </a:p>
-        </p:txBody>
-      </p:sp>
-      <p:sp>
-        <p:nvSpPr>
-          <p:cNvPr id="8" name="TextBox 7">
-            <a:extLst>
-              <a:ext uri="{FF2B5EF4-FFF2-40B4-BE49-F238E27FC236}">
-                <a16:creationId xmlns:a16="http://schemas.microsoft.com/office/drawing/2014/main" id="{0F12B1BA-722B-A5C6-9F99-C5010BBD80B9}"/>
-              </a:ext>
-            </a:extLst>
-          </p:cNvPr>
-          <p:cNvSpPr txBox="1"/>
-          <p:nvPr/>
-        </p:nvSpPr>
-        <p:spPr>
-          <a:xfrm>
-            <a:off x="9236992" y="2329132"/>
-            <a:ext cx="415498" cy="369332"/>
-          </a:xfrm>
-          <a:prstGeom prst="rect">
-            <a:avLst/>
-          </a:prstGeom>
-          <a:noFill/>
-        </p:spPr>
-        <p:txBody>
-          <a:bodyPr wrap="none" rtlCol="0">
-            <a:spAutoFit/>
-          </a:bodyPr>
-          <a:lstStyle/>
-          <a:p>
-            <a:r>
-              <a:rPr lang="en-US" dirty="0"/>
-              <a:t>**</a:t>
-            </a:r>
-          </a:p>
-        </p:txBody>
-      </p:sp>
-      <p:sp>
-        <p:nvSpPr>
-          <p:cNvPr id="11" name="TextBox 10">
-            <a:extLst>
-              <a:ext uri="{FF2B5EF4-FFF2-40B4-BE49-F238E27FC236}">
-                <a16:creationId xmlns:a16="http://schemas.microsoft.com/office/drawing/2014/main" id="{EFB7F415-E751-3415-547F-EF5F6D507C9E}"/>
-              </a:ext>
-            </a:extLst>
-          </p:cNvPr>
-          <p:cNvSpPr txBox="1"/>
-          <p:nvPr/>
-        </p:nvSpPr>
-        <p:spPr>
-          <a:xfrm>
-            <a:off x="2717345" y="6488668"/>
-            <a:ext cx="7382653" cy="369332"/>
-          </a:xfrm>
-          <a:prstGeom prst="rect">
-            <a:avLst/>
-          </a:prstGeom>
-          <a:noFill/>
-        </p:spPr>
-        <p:txBody>
-          <a:bodyPr wrap="square" rtlCol="0">
-            <a:spAutoFit/>
-          </a:bodyPr>
-          <a:lstStyle/>
-          <a:p>
-            <a:r>
-              <a:rPr lang="en-US" sz="1800" dirty="0">
-                <a:effectLst/>
-                <a:ea typeface="Calibri" panose="020F0502020204030204" pitchFamily="34" charset="0"/>
-                <a:cs typeface="Times New Roman" panose="02020603050405020304" pitchFamily="18" charset="0"/>
-              </a:rPr>
-              <a:t>Wilcox rank sum test: ****; </a:t>
-            </a:r>
-            <a:r>
-              <a:rPr lang="en-US" sz="1800" dirty="0" err="1">
-                <a:effectLst/>
-                <a:ea typeface="Calibri" panose="020F0502020204030204" pitchFamily="34" charset="0"/>
-                <a:cs typeface="Times New Roman" panose="02020603050405020304" pitchFamily="18" charset="0"/>
-              </a:rPr>
-              <a:t>padj</a:t>
-            </a:r>
-            <a:r>
-              <a:rPr lang="en-US" sz="1800" dirty="0">
-                <a:effectLst/>
-                <a:ea typeface="Calibri" panose="020F0502020204030204" pitchFamily="34" charset="0"/>
-                <a:cs typeface="Times New Roman" panose="02020603050405020304" pitchFamily="18" charset="0"/>
-              </a:rPr>
-              <a:t> &lt; 1e-4, **; </a:t>
-            </a:r>
-            <a:r>
-              <a:rPr lang="en-US" sz="1800" dirty="0" err="1">
-                <a:effectLst/>
-                <a:ea typeface="Calibri" panose="020F0502020204030204" pitchFamily="34" charset="0"/>
-                <a:cs typeface="Times New Roman" panose="02020603050405020304" pitchFamily="18" charset="0"/>
-              </a:rPr>
-              <a:t>padj</a:t>
-            </a:r>
-            <a:r>
-              <a:rPr lang="en-US" sz="1800" dirty="0">
-                <a:effectLst/>
-                <a:ea typeface="Calibri" panose="020F0502020204030204" pitchFamily="34" charset="0"/>
-                <a:cs typeface="Times New Roman" panose="02020603050405020304" pitchFamily="18" charset="0"/>
-              </a:rPr>
-              <a:t> &lt;1e-2, *; </a:t>
-            </a:r>
-            <a:r>
-              <a:rPr lang="en-US" sz="1800" dirty="0" err="1">
-                <a:effectLst/>
-                <a:ea typeface="Calibri" panose="020F0502020204030204" pitchFamily="34" charset="0"/>
-                <a:cs typeface="Times New Roman" panose="02020603050405020304" pitchFamily="18" charset="0"/>
-              </a:rPr>
-              <a:t>padj</a:t>
-            </a:r>
-            <a:r>
-              <a:rPr lang="en-US" sz="1800" dirty="0">
-                <a:effectLst/>
-                <a:ea typeface="Calibri" panose="020F0502020204030204" pitchFamily="34" charset="0"/>
-                <a:cs typeface="Times New Roman" panose="02020603050405020304" pitchFamily="18" charset="0"/>
-              </a:rPr>
-              <a:t> &lt;0.05</a:t>
-            </a:r>
-            <a:endParaRPr lang="en-US" sz="1800" b="0" i="0" u="none" strike="noStrike" dirty="0">
-              <a:solidFill>
-                <a:srgbClr val="212121"/>
-              </a:solidFill>
-              <a:effectLst/>
-            </a:endParaRPr>
-          </a:p>
-        </p:txBody>
-      </p:sp>
-    </p:spTree>
-    <p:extLst>
-      <p:ext uri="{BB962C8B-B14F-4D97-AF65-F5344CB8AC3E}">
-        <p14:creationId xmlns:p14="http://schemas.microsoft.com/office/powerpoint/2010/main" val="3139615767"/>
-      </p:ext>
-    </p:extLst>
-  </p:cSld>
-  <p:clrMapOvr>
-    <a:masterClrMapping/>
-  </p:clrMapOvr>
-</p:sld>
-</file>
-
-<file path=ppt/slides/slide13.xml><?xml version="1.0" encoding="utf-8"?>
 <p:sld xmlns:a="http://schemas.openxmlformats.org/drawingml/2006/main" xmlns:r="http://schemas.openxmlformats.org/officeDocument/2006/relationships" xmlns:p="http://schemas.openxmlformats.org/presentationml/2006/main">
   <p:cSld>
     <p:spTree>
@@ -6566,7 +6315,7 @@
 </p:sld>
 </file>
 
-<file path=ppt/slides/slide14.xml><?xml version="1.0" encoding="utf-8"?>
+<file path=ppt/slides/slide13.xml><?xml version="1.0" encoding="utf-8"?>
 <p:sld xmlns:a="http://schemas.openxmlformats.org/drawingml/2006/main" xmlns:r="http://schemas.openxmlformats.org/officeDocument/2006/relationships" xmlns:p="http://schemas.openxmlformats.org/presentationml/2006/main">
   <p:cSld>
     <p:spTree>

</xml_diff>